<commit_message>
Updated to reflect changes in the flowchart
</commit_message>
<xml_diff>
--- a/Milestone2/Lending Library Team.pptx
+++ b/Milestone2/Lending Library Team.pptx
@@ -7425,19 +7425,17 @@
       </p:sp>
       <p:pic>
         <p:nvPicPr>
-          <p:cNvPr id="5" name="Content Placeholder 4" descr="A screenshot of a cell phone&#10;&#10;Description automatically generated">
+          <p:cNvPr id="7" name="Picture 6">
             <a:extLst>
               <a:ext uri="{FF2B5EF4-FFF2-40B4-BE49-F238E27FC236}">
-                <a16:creationId xmlns:a16="http://schemas.microsoft.com/office/drawing/2014/main" id="{9F748D12-E3E4-4B2B-BAE9-14F6BC6DCB59}"/>
+                <a16:creationId xmlns:a16="http://schemas.microsoft.com/office/drawing/2014/main" id="{9EE67343-ACD2-4A99-9745-E2FFFE78425B}"/>
               </a:ext>
             </a:extLst>
           </p:cNvPr>
           <p:cNvPicPr>
-            <a:picLocks noGrp="1" noChangeAspect="1"/>
+            <a:picLocks noChangeAspect="1"/>
           </p:cNvPicPr>
-          <p:nvPr>
-            <p:ph idx="1"/>
-          </p:nvPr>
+          <p:nvPr/>
         </p:nvPicPr>
         <p:blipFill rotWithShape="1">
           <a:blip r:embed="rId2">
@@ -7447,14 +7445,17 @@
               </a:ext>
             </a:extLst>
           </a:blip>
-          <a:srcRect l="1027" t="3027"/>
+          <a:srcRect l="1250" t="3492" r="1094" b="3287"/>
           <a:stretch/>
         </p:blipFill>
         <p:spPr>
           <a:xfrm>
-            <a:off x="467522" y="1722473"/>
-            <a:ext cx="11246307" cy="4210493"/>
+            <a:off x="142875" y="1580050"/>
+            <a:ext cx="11906250" cy="4333876"/>
           </a:xfrm>
+          <a:prstGeom prst="rect">
+            <a:avLst/>
+          </a:prstGeom>
         </p:spPr>
       </p:pic>
     </p:spTree>

</xml_diff>